<commit_message>
Mais frases na apresentação.
</commit_message>
<xml_diff>
--- a/apresentacoes/frases.pptx
+++ b/apresentacoes/frases.pptx
@@ -5,8 +5,14 @@
     <p:sldMasterId id="2147483648" r:id="rId1"/>
   </p:sldMasterIdLst>
   <p:sldIdLst>
-    <p:sldId id="256" r:id="rId2"/>
-    <p:sldId id="257" r:id="rId3"/>
+    <p:sldId id="260" r:id="rId2"/>
+    <p:sldId id="256" r:id="rId3"/>
+    <p:sldId id="257" r:id="rId4"/>
+    <p:sldId id="258" r:id="rId5"/>
+    <p:sldId id="259" r:id="rId6"/>
+    <p:sldId id="261" r:id="rId7"/>
+    <p:sldId id="262" r:id="rId8"/>
+    <p:sldId id="263" r:id="rId9"/>
   </p:sldIdLst>
   <p:sldSz cx="9144000" cy="6858000" type="screen4x3"/>
   <p:notesSz cx="6858000" cy="9144000"/>
@@ -289,7 +295,8 @@
           <a:p>
             <a:fld id="{D8524F19-D7D1-4003-92B1-ECF8F232244C}" type="datetimeFigureOut">
               <a:rPr lang="pt-BR" smtClean="0"/>
-              <a:t>29/2/2012</a:t>
+              <a:pPr/>
+              <a:t>2/3/2012</a:t>
             </a:fld>
             <a:endParaRPr lang="pt-BR"/>
           </a:p>
@@ -331,6 +338,7 @@
           <a:p>
             <a:fld id="{D253BA36-DDC6-48CD-A1BD-A21D8F6F8A66}" type="slidenum">
               <a:rPr lang="pt-BR" smtClean="0"/>
+              <a:pPr/>
               <a:t>‹nº›</a:t>
             </a:fld>
             <a:endParaRPr lang="pt-BR"/>
@@ -454,7 +462,8 @@
           <a:p>
             <a:fld id="{D8524F19-D7D1-4003-92B1-ECF8F232244C}" type="datetimeFigureOut">
               <a:rPr lang="pt-BR" smtClean="0"/>
-              <a:t>29/2/2012</a:t>
+              <a:pPr/>
+              <a:t>2/3/2012</a:t>
             </a:fld>
             <a:endParaRPr lang="pt-BR"/>
           </a:p>
@@ -496,6 +505,7 @@
           <a:p>
             <a:fld id="{D253BA36-DDC6-48CD-A1BD-A21D8F6F8A66}" type="slidenum">
               <a:rPr lang="pt-BR" smtClean="0"/>
+              <a:pPr/>
               <a:t>‹nº›</a:t>
             </a:fld>
             <a:endParaRPr lang="pt-BR"/>
@@ -629,7 +639,8 @@
           <a:p>
             <a:fld id="{D8524F19-D7D1-4003-92B1-ECF8F232244C}" type="datetimeFigureOut">
               <a:rPr lang="pt-BR" smtClean="0"/>
-              <a:t>29/2/2012</a:t>
+              <a:pPr/>
+              <a:t>2/3/2012</a:t>
             </a:fld>
             <a:endParaRPr lang="pt-BR"/>
           </a:p>
@@ -671,6 +682,7 @@
           <a:p>
             <a:fld id="{D253BA36-DDC6-48CD-A1BD-A21D8F6F8A66}" type="slidenum">
               <a:rPr lang="pt-BR" smtClean="0"/>
+              <a:pPr/>
               <a:t>‹nº›</a:t>
             </a:fld>
             <a:endParaRPr lang="pt-BR"/>
@@ -794,7 +806,8 @@
           <a:p>
             <a:fld id="{D8524F19-D7D1-4003-92B1-ECF8F232244C}" type="datetimeFigureOut">
               <a:rPr lang="pt-BR" smtClean="0"/>
-              <a:t>29/2/2012</a:t>
+              <a:pPr/>
+              <a:t>2/3/2012</a:t>
             </a:fld>
             <a:endParaRPr lang="pt-BR"/>
           </a:p>
@@ -836,6 +849,7 @@
           <a:p>
             <a:fld id="{D253BA36-DDC6-48CD-A1BD-A21D8F6F8A66}" type="slidenum">
               <a:rPr lang="pt-BR" smtClean="0"/>
+              <a:pPr/>
               <a:t>‹nº›</a:t>
             </a:fld>
             <a:endParaRPr lang="pt-BR"/>
@@ -1035,7 +1049,8 @@
           <a:p>
             <a:fld id="{D8524F19-D7D1-4003-92B1-ECF8F232244C}" type="datetimeFigureOut">
               <a:rPr lang="pt-BR" smtClean="0"/>
-              <a:t>29/2/2012</a:t>
+              <a:pPr/>
+              <a:t>2/3/2012</a:t>
             </a:fld>
             <a:endParaRPr lang="pt-BR"/>
           </a:p>
@@ -1077,6 +1092,7 @@
           <a:p>
             <a:fld id="{D253BA36-DDC6-48CD-A1BD-A21D8F6F8A66}" type="slidenum">
               <a:rPr lang="pt-BR" smtClean="0"/>
+              <a:pPr/>
               <a:t>‹nº›</a:t>
             </a:fld>
             <a:endParaRPr lang="pt-BR"/>
@@ -1318,7 +1334,8 @@
           <a:p>
             <a:fld id="{D8524F19-D7D1-4003-92B1-ECF8F232244C}" type="datetimeFigureOut">
               <a:rPr lang="pt-BR" smtClean="0"/>
-              <a:t>29/2/2012</a:t>
+              <a:pPr/>
+              <a:t>2/3/2012</a:t>
             </a:fld>
             <a:endParaRPr lang="pt-BR"/>
           </a:p>
@@ -1360,6 +1377,7 @@
           <a:p>
             <a:fld id="{D253BA36-DDC6-48CD-A1BD-A21D8F6F8A66}" type="slidenum">
               <a:rPr lang="pt-BR" smtClean="0"/>
+              <a:pPr/>
               <a:t>‹nº›</a:t>
             </a:fld>
             <a:endParaRPr lang="pt-BR"/>
@@ -1735,7 +1753,8 @@
           <a:p>
             <a:fld id="{D8524F19-D7D1-4003-92B1-ECF8F232244C}" type="datetimeFigureOut">
               <a:rPr lang="pt-BR" smtClean="0"/>
-              <a:t>29/2/2012</a:t>
+              <a:pPr/>
+              <a:t>2/3/2012</a:t>
             </a:fld>
             <a:endParaRPr lang="pt-BR"/>
           </a:p>
@@ -1777,6 +1796,7 @@
           <a:p>
             <a:fld id="{D253BA36-DDC6-48CD-A1BD-A21D8F6F8A66}" type="slidenum">
               <a:rPr lang="pt-BR" smtClean="0"/>
+              <a:pPr/>
               <a:t>‹nº›</a:t>
             </a:fld>
             <a:endParaRPr lang="pt-BR"/>
@@ -1848,7 +1868,8 @@
           <a:p>
             <a:fld id="{D8524F19-D7D1-4003-92B1-ECF8F232244C}" type="datetimeFigureOut">
               <a:rPr lang="pt-BR" smtClean="0"/>
-              <a:t>29/2/2012</a:t>
+              <a:pPr/>
+              <a:t>2/3/2012</a:t>
             </a:fld>
             <a:endParaRPr lang="pt-BR"/>
           </a:p>
@@ -1890,6 +1911,7 @@
           <a:p>
             <a:fld id="{D253BA36-DDC6-48CD-A1BD-A21D8F6F8A66}" type="slidenum">
               <a:rPr lang="pt-BR" smtClean="0"/>
+              <a:pPr/>
               <a:t>‹nº›</a:t>
             </a:fld>
             <a:endParaRPr lang="pt-BR"/>
@@ -1938,7 +1960,8 @@
           <a:p>
             <a:fld id="{D8524F19-D7D1-4003-92B1-ECF8F232244C}" type="datetimeFigureOut">
               <a:rPr lang="pt-BR" smtClean="0"/>
-              <a:t>29/2/2012</a:t>
+              <a:pPr/>
+              <a:t>2/3/2012</a:t>
             </a:fld>
             <a:endParaRPr lang="pt-BR"/>
           </a:p>
@@ -1980,6 +2003,7 @@
           <a:p>
             <a:fld id="{D253BA36-DDC6-48CD-A1BD-A21D8F6F8A66}" type="slidenum">
               <a:rPr lang="pt-BR" smtClean="0"/>
+              <a:pPr/>
               <a:t>‹nº›</a:t>
             </a:fld>
             <a:endParaRPr lang="pt-BR"/>
@@ -2210,7 +2234,8 @@
           <a:p>
             <a:fld id="{D8524F19-D7D1-4003-92B1-ECF8F232244C}" type="datetimeFigureOut">
               <a:rPr lang="pt-BR" smtClean="0"/>
-              <a:t>29/2/2012</a:t>
+              <a:pPr/>
+              <a:t>2/3/2012</a:t>
             </a:fld>
             <a:endParaRPr lang="pt-BR"/>
           </a:p>
@@ -2252,6 +2277,7 @@
           <a:p>
             <a:fld id="{D253BA36-DDC6-48CD-A1BD-A21D8F6F8A66}" type="slidenum">
               <a:rPr lang="pt-BR" smtClean="0"/>
+              <a:pPr/>
               <a:t>‹nº›</a:t>
             </a:fld>
             <a:endParaRPr lang="pt-BR"/>
@@ -2458,7 +2484,8 @@
           <a:p>
             <a:fld id="{D8524F19-D7D1-4003-92B1-ECF8F232244C}" type="datetimeFigureOut">
               <a:rPr lang="pt-BR" smtClean="0"/>
-              <a:t>29/2/2012</a:t>
+              <a:pPr/>
+              <a:t>2/3/2012</a:t>
             </a:fld>
             <a:endParaRPr lang="pt-BR"/>
           </a:p>
@@ -2500,6 +2527,7 @@
           <a:p>
             <a:fld id="{D253BA36-DDC6-48CD-A1BD-A21D8F6F8A66}" type="slidenum">
               <a:rPr lang="pt-BR" smtClean="0"/>
+              <a:pPr/>
               <a:t>‹nº›</a:t>
             </a:fld>
             <a:endParaRPr lang="pt-BR"/>
@@ -2666,7 +2694,8 @@
           <a:p>
             <a:fld id="{D8524F19-D7D1-4003-92B1-ECF8F232244C}" type="datetimeFigureOut">
               <a:rPr lang="pt-BR" smtClean="0"/>
-              <a:t>29/2/2012</a:t>
+              <a:pPr/>
+              <a:t>2/3/2012</a:t>
             </a:fld>
             <a:endParaRPr lang="pt-BR"/>
           </a:p>
@@ -2744,6 +2773,7 @@
           <a:p>
             <a:fld id="{D253BA36-DDC6-48CD-A1BD-A21D8F6F8A66}" type="slidenum">
               <a:rPr lang="pt-BR" smtClean="0"/>
+              <a:pPr/>
               <a:t>‹nº›</a:t>
             </a:fld>
             <a:endParaRPr lang="pt-BR"/>
@@ -3046,39 +3076,30 @@
             <p:ph type="ctrTitle"/>
           </p:nvPr>
         </p:nvSpPr>
-        <p:spPr/>
-        <p:txBody>
-          <a:bodyPr/>
-          <a:lstStyle/>
-          <a:p>
-            <a:r>
-              <a:rPr lang="pt-BR" dirty="0" smtClean="0"/>
+        <p:spPr>
+          <a:xfrm>
+            <a:off x="685800" y="2143117"/>
+            <a:ext cx="7772400" cy="2428892"/>
+          </a:xfrm>
+        </p:spPr>
+        <p:txBody>
+          <a:bodyPr>
+            <a:noAutofit/>
+          </a:bodyPr>
+          <a:lstStyle/>
+          <a:p>
+            <a:r>
+              <a:rPr lang="pt-BR" sz="7200" b="1" i="1" dirty="0" smtClean="0"/>
               <a:t>Frases</a:t>
             </a:r>
-            <a:endParaRPr lang="pt-BR" dirty="0"/>
-          </a:p>
-        </p:txBody>
-      </p:sp>
-      <p:sp>
-        <p:nvSpPr>
-          <p:cNvPr id="3" name="Subtítulo 2"/>
-          <p:cNvSpPr>
-            <a:spLocks noGrp="1"/>
-          </p:cNvSpPr>
-          <p:nvPr>
-            <p:ph type="subTitle" idx="1"/>
-          </p:nvPr>
-        </p:nvSpPr>
-        <p:spPr/>
-        <p:txBody>
-          <a:bodyPr/>
-          <a:lstStyle/>
-          <a:p>
-            <a:r>
-              <a:rPr lang="pt-BR" dirty="0" smtClean="0"/>
-              <a:t>Educacional</a:t>
-            </a:r>
-            <a:endParaRPr lang="pt-BR" dirty="0"/>
+            <a:br>
+              <a:rPr lang="pt-BR" sz="7200" b="1" i="1" dirty="0" smtClean="0"/>
+            </a:br>
+            <a:r>
+              <a:rPr lang="pt-BR" sz="7200" b="1" i="1" dirty="0" smtClean="0"/>
+              <a:t>para Reflexão</a:t>
+            </a:r>
+            <a:endParaRPr lang="pt-BR" sz="7200" b="1" i="1" dirty="0"/>
           </a:p>
         </p:txBody>
       </p:sp>
@@ -3109,14 +3130,99 @@
       </p:grpSpPr>
       <p:sp>
         <p:nvSpPr>
+          <p:cNvPr id="2" name="Título 1"/>
+          <p:cNvSpPr>
+            <a:spLocks noGrp="1"/>
+          </p:cNvSpPr>
+          <p:nvPr>
+            <p:ph type="ctrTitle"/>
+          </p:nvPr>
+        </p:nvSpPr>
+        <p:spPr>
+          <a:xfrm>
+            <a:off x="685800" y="2130425"/>
+            <a:ext cx="7772400" cy="1470025"/>
+          </a:xfrm>
+        </p:spPr>
+        <p:txBody>
+          <a:bodyPr>
+            <a:normAutofit/>
+          </a:bodyPr>
+          <a:lstStyle/>
+          <a:p>
+            <a:r>
+              <a:rPr lang="pt-BR" sz="5400" dirty="0" smtClean="0"/>
+              <a:t>Frases</a:t>
+            </a:r>
+            <a:endParaRPr lang="pt-BR" sz="5400" dirty="0"/>
+          </a:p>
+        </p:txBody>
+      </p:sp>
+      <p:sp>
+        <p:nvSpPr>
+          <p:cNvPr id="3" name="Subtítulo 2"/>
+          <p:cNvSpPr>
+            <a:spLocks noGrp="1"/>
+          </p:cNvSpPr>
+          <p:nvPr>
+            <p:ph type="subTitle" idx="1"/>
+          </p:nvPr>
+        </p:nvSpPr>
+        <p:spPr>
+          <a:xfrm>
+            <a:off x="1371600" y="3605226"/>
+            <a:ext cx="6400800" cy="1752600"/>
+          </a:xfrm>
+        </p:spPr>
+        <p:txBody>
+          <a:bodyPr>
+            <a:normAutofit/>
+          </a:bodyPr>
+          <a:lstStyle/>
+          <a:p>
+            <a:r>
+              <a:rPr lang="pt-BR" sz="4800" dirty="0" smtClean="0"/>
+              <a:t>Educacional</a:t>
+            </a:r>
+            <a:endParaRPr lang="pt-BR" sz="4800" dirty="0"/>
+          </a:p>
+        </p:txBody>
+      </p:sp>
+    </p:spTree>
+  </p:cSld>
+  <p:clrMapOvr>
+    <a:masterClrMapping/>
+  </p:clrMapOvr>
+</p:sld>
+</file>
+
+<file path=ppt/slides/slide3.xml><?xml version="1.0" encoding="utf-8"?>
+<p:sld xmlns:a="http://schemas.openxmlformats.org/drawingml/2006/main" xmlns:r="http://schemas.openxmlformats.org/officeDocument/2006/relationships" xmlns:p="http://schemas.openxmlformats.org/presentationml/2006/main">
+  <p:cSld>
+    <p:spTree>
+      <p:nvGrpSpPr>
+        <p:cNvPr id="1" name=""/>
+        <p:cNvGrpSpPr/>
+        <p:nvPr/>
+      </p:nvGrpSpPr>
+      <p:grpSpPr>
+        <a:xfrm>
+          <a:off x="0" y="0"/>
+          <a:ext cx="0" cy="0"/>
+          <a:chOff x="0" y="0"/>
+          <a:chExt cx="0" cy="0"/>
+        </a:xfrm>
+      </p:grpSpPr>
+      <p:sp>
+        <p:nvSpPr>
           <p:cNvPr id="3" name="CaixaDeTexto 2"/>
           <p:cNvSpPr txBox="1"/>
           <p:nvPr/>
         </p:nvSpPr>
         <p:spPr>
           <a:xfrm>
-            <a:off x="642910" y="2071678"/>
-            <a:ext cx="7786742" cy="2677656"/>
+            <a:off x="285720" y="2071678"/>
+            <a:ext cx="8572592" cy="2677656"/>
           </a:xfrm>
           <a:prstGeom prst="rect">
             <a:avLst/>
@@ -3130,49 +3236,709 @@
           <a:lstStyle/>
           <a:p>
             <a:r>
-              <a:rPr lang="pt-BR" sz="2800" dirty="0" smtClean="0"/>
+              <a:rPr lang="pt-BR" sz="2800" b="1" dirty="0" smtClean="0">
+                <a:latin typeface="Book Antiqua" pitchFamily="18" charset="0"/>
+              </a:rPr>
               <a:t/>
             </a:r>
             <a:br>
-              <a:rPr lang="pt-BR" sz="2800" dirty="0" smtClean="0"/>
+              <a:rPr lang="pt-BR" sz="2800" b="1" dirty="0" smtClean="0">
+                <a:latin typeface="Book Antiqua" pitchFamily="18" charset="0"/>
+              </a:rPr>
             </a:br>
             <a:r>
-              <a:rPr lang="pt-BR" sz="2800" dirty="0" smtClean="0"/>
+              <a:rPr lang="pt-BR" sz="2800" b="1" dirty="0" smtClean="0">
+                <a:latin typeface="Book Antiqua" pitchFamily="18" charset="0"/>
+              </a:rPr>
               <a:t/>
             </a:r>
             <a:br>
-              <a:rPr lang="pt-BR" sz="2800" dirty="0" smtClean="0"/>
+              <a:rPr lang="pt-BR" sz="2800" b="1" dirty="0" smtClean="0">
+                <a:latin typeface="Book Antiqua" pitchFamily="18" charset="0"/>
+              </a:rPr>
             </a:br>
             <a:r>
-              <a:rPr lang="pt-BR" sz="2800" i="1" dirty="0" smtClean="0"/>
+              <a:rPr lang="pt-BR" sz="2800" b="1" i="1" dirty="0" smtClean="0">
+                <a:latin typeface="Book Antiqua" pitchFamily="18" charset="0"/>
+              </a:rPr>
               <a:t>"Não se pode ensinar coisa alguma a alguém;</a:t>
             </a:r>
             <a:br>
-              <a:rPr lang="pt-BR" sz="2800" i="1" dirty="0" smtClean="0"/>
+              <a:rPr lang="pt-BR" sz="2800" b="1" i="1" dirty="0" smtClean="0">
+                <a:latin typeface="Book Antiqua" pitchFamily="18" charset="0"/>
+              </a:rPr>
             </a:br>
             <a:r>
-              <a:rPr lang="pt-BR" sz="2800" i="1" dirty="0" smtClean="0"/>
+              <a:rPr lang="pt-BR" sz="2800" b="1" i="1" dirty="0" smtClean="0">
+                <a:latin typeface="Book Antiqua" pitchFamily="18" charset="0"/>
+              </a:rPr>
               <a:t>pode-se apenas auxiliá-la a descobrir por si mesmo." </a:t>
             </a:r>
           </a:p>
           <a:p>
-            <a:endParaRPr lang="pt-BR" sz="2800" i="1" dirty="0" smtClean="0"/>
+            <a:endParaRPr lang="pt-BR" sz="2800" b="1" i="1" dirty="0" smtClean="0">
+              <a:latin typeface="Book Antiqua" pitchFamily="18" charset="0"/>
+            </a:endParaRPr>
           </a:p>
           <a:p>
             <a:pPr algn="r"/>
             <a:r>
-              <a:rPr lang="pt-BR" sz="2800" dirty="0" smtClean="0"/>
+              <a:rPr lang="pt-BR" sz="2800" b="1" dirty="0" smtClean="0">
+                <a:latin typeface="Book Antiqua" pitchFamily="18" charset="0"/>
+              </a:rPr>
               <a:t>(Galileu </a:t>
             </a:r>
             <a:r>
-              <a:rPr lang="pt-BR" sz="2800" dirty="0" err="1" smtClean="0"/>
+              <a:rPr lang="pt-BR" sz="2800" b="1" dirty="0" err="1" smtClean="0">
+                <a:latin typeface="Book Antiqua" pitchFamily="18" charset="0"/>
+              </a:rPr>
               <a:t>Galilei</a:t>
             </a:r>
             <a:r>
-              <a:rPr lang="pt-BR" sz="2800" dirty="0" smtClean="0"/>
+              <a:rPr lang="pt-BR" sz="2800" b="1" dirty="0" smtClean="0">
+                <a:latin typeface="Book Antiqua" pitchFamily="18" charset="0"/>
+              </a:rPr>
               <a:t>)</a:t>
             </a:r>
-            <a:endParaRPr lang="pt-BR" sz="2800" dirty="0"/>
+            <a:endParaRPr lang="pt-BR" sz="2800" b="1" dirty="0">
+              <a:latin typeface="Book Antiqua" pitchFamily="18" charset="0"/>
+            </a:endParaRPr>
+          </a:p>
+        </p:txBody>
+      </p:sp>
+    </p:spTree>
+  </p:cSld>
+  <p:clrMapOvr>
+    <a:masterClrMapping/>
+  </p:clrMapOvr>
+</p:sld>
+</file>
+
+<file path=ppt/slides/slide4.xml><?xml version="1.0" encoding="utf-8"?>
+<p:sld xmlns:a="http://schemas.openxmlformats.org/drawingml/2006/main" xmlns:r="http://schemas.openxmlformats.org/officeDocument/2006/relationships" xmlns:p="http://schemas.openxmlformats.org/presentationml/2006/main">
+  <p:cSld>
+    <p:spTree>
+      <p:nvGrpSpPr>
+        <p:cNvPr id="1" name=""/>
+        <p:cNvGrpSpPr/>
+        <p:nvPr/>
+      </p:nvGrpSpPr>
+      <p:grpSpPr>
+        <a:xfrm>
+          <a:off x="0" y="0"/>
+          <a:ext cx="0" cy="0"/>
+          <a:chOff x="0" y="0"/>
+          <a:chExt cx="0" cy="0"/>
+        </a:xfrm>
+      </p:grpSpPr>
+      <p:sp>
+        <p:nvSpPr>
+          <p:cNvPr id="3" name="CaixaDeTexto 2"/>
+          <p:cNvSpPr txBox="1"/>
+          <p:nvPr/>
+        </p:nvSpPr>
+        <p:spPr>
+          <a:xfrm>
+            <a:off x="1285852" y="2071678"/>
+            <a:ext cx="6572296" cy="2677656"/>
+          </a:xfrm>
+          <a:prstGeom prst="rect">
+            <a:avLst/>
+          </a:prstGeom>
+          <a:noFill/>
+        </p:spPr>
+        <p:txBody>
+          <a:bodyPr wrap="square" rtlCol="0">
+            <a:spAutoFit/>
+          </a:bodyPr>
+          <a:lstStyle/>
+          <a:p>
+            <a:pPr algn="ctr"/>
+            <a:r>
+              <a:rPr lang="pt-BR" sz="2800" b="1" dirty="0" smtClean="0">
+                <a:latin typeface="Book Antiqua" pitchFamily="18" charset="0"/>
+              </a:rPr>
+              <a:t/>
+            </a:r>
+            <a:br>
+              <a:rPr lang="pt-BR" sz="2800" b="1" dirty="0" smtClean="0">
+                <a:latin typeface="Book Antiqua" pitchFamily="18" charset="0"/>
+              </a:rPr>
+            </a:br>
+            <a:r>
+              <a:rPr lang="pt-BR" sz="2800" b="1" dirty="0" smtClean="0">
+                <a:latin typeface="Book Antiqua" pitchFamily="18" charset="0"/>
+              </a:rPr>
+              <a:t/>
+            </a:r>
+            <a:br>
+              <a:rPr lang="pt-BR" sz="2800" b="1" dirty="0" smtClean="0">
+                <a:latin typeface="Book Antiqua" pitchFamily="18" charset="0"/>
+              </a:rPr>
+            </a:br>
+            <a:r>
+              <a:rPr lang="pt-BR" sz="2800" b="1" i="1" dirty="0" smtClean="0">
+                <a:latin typeface="Book Antiqua" pitchFamily="18" charset="0"/>
+              </a:rPr>
+              <a:t>"</a:t>
+            </a:r>
+            <a:r>
+              <a:rPr lang="pt-BR" sz="2800" b="1" i="1" dirty="0" smtClean="0">
+                <a:latin typeface="Book Antiqua" pitchFamily="18" charset="0"/>
+              </a:rPr>
+              <a:t>A condição natural dos corpos não é o repouso, mas o movimento</a:t>
+            </a:r>
+            <a:r>
+              <a:rPr lang="pt-BR" sz="2800" b="1" i="1" dirty="0" smtClean="0">
+                <a:latin typeface="Book Antiqua" pitchFamily="18" charset="0"/>
+              </a:rPr>
+              <a:t>.</a:t>
+            </a:r>
+            <a:r>
+              <a:rPr lang="pt-BR" sz="2800" b="1" i="1" dirty="0" smtClean="0">
+                <a:latin typeface="Book Antiqua" pitchFamily="18" charset="0"/>
+              </a:rPr>
+              <a:t>" </a:t>
+            </a:r>
+            <a:endParaRPr lang="pt-BR" sz="2800" b="1" i="1" dirty="0" smtClean="0">
+              <a:latin typeface="Book Antiqua" pitchFamily="18" charset="0"/>
+            </a:endParaRPr>
+          </a:p>
+          <a:p>
+            <a:endParaRPr lang="pt-BR" sz="2800" b="1" i="1" dirty="0" smtClean="0">
+              <a:latin typeface="Book Antiqua" pitchFamily="18" charset="0"/>
+            </a:endParaRPr>
+          </a:p>
+          <a:p>
+            <a:pPr algn="r"/>
+            <a:r>
+              <a:rPr lang="pt-BR" sz="2800" b="1" dirty="0" smtClean="0">
+                <a:latin typeface="Book Antiqua" pitchFamily="18" charset="0"/>
+              </a:rPr>
+              <a:t>(Galileu </a:t>
+            </a:r>
+            <a:r>
+              <a:rPr lang="pt-BR" sz="2800" b="1" dirty="0" err="1" smtClean="0">
+                <a:latin typeface="Book Antiqua" pitchFamily="18" charset="0"/>
+              </a:rPr>
+              <a:t>Galilei</a:t>
+            </a:r>
+            <a:r>
+              <a:rPr lang="pt-BR" sz="2800" b="1" dirty="0" smtClean="0">
+                <a:latin typeface="Book Antiqua" pitchFamily="18" charset="0"/>
+              </a:rPr>
+              <a:t>)</a:t>
+            </a:r>
+            <a:endParaRPr lang="pt-BR" sz="2800" b="1" dirty="0">
+              <a:latin typeface="Book Antiqua" pitchFamily="18" charset="0"/>
+            </a:endParaRPr>
+          </a:p>
+        </p:txBody>
+      </p:sp>
+    </p:spTree>
+  </p:cSld>
+  <p:clrMapOvr>
+    <a:masterClrMapping/>
+  </p:clrMapOvr>
+</p:sld>
+</file>
+
+<file path=ppt/slides/slide5.xml><?xml version="1.0" encoding="utf-8"?>
+<p:sld xmlns:a="http://schemas.openxmlformats.org/drawingml/2006/main" xmlns:r="http://schemas.openxmlformats.org/officeDocument/2006/relationships" xmlns:p="http://schemas.openxmlformats.org/presentationml/2006/main">
+  <p:cSld>
+    <p:spTree>
+      <p:nvGrpSpPr>
+        <p:cNvPr id="1" name=""/>
+        <p:cNvGrpSpPr/>
+        <p:nvPr/>
+      </p:nvGrpSpPr>
+      <p:grpSpPr>
+        <a:xfrm>
+          <a:off x="0" y="0"/>
+          <a:ext cx="0" cy="0"/>
+          <a:chOff x="0" y="0"/>
+          <a:chExt cx="0" cy="0"/>
+        </a:xfrm>
+      </p:grpSpPr>
+      <p:sp>
+        <p:nvSpPr>
+          <p:cNvPr id="3" name="CaixaDeTexto 2"/>
+          <p:cNvSpPr txBox="1"/>
+          <p:nvPr/>
+        </p:nvSpPr>
+        <p:spPr>
+          <a:xfrm>
+            <a:off x="1714480" y="2071678"/>
+            <a:ext cx="5786478" cy="2677656"/>
+          </a:xfrm>
+          <a:prstGeom prst="rect">
+            <a:avLst/>
+          </a:prstGeom>
+          <a:noFill/>
+        </p:spPr>
+        <p:txBody>
+          <a:bodyPr wrap="square" rtlCol="0">
+            <a:spAutoFit/>
+          </a:bodyPr>
+          <a:lstStyle/>
+          <a:p>
+            <a:pPr algn="ctr"/>
+            <a:r>
+              <a:rPr lang="pt-BR" sz="2800" b="1" spc="110" dirty="0" smtClean="0">
+                <a:latin typeface="Book Antiqua" pitchFamily="18" charset="0"/>
+              </a:rPr>
+              <a:t/>
+            </a:r>
+            <a:br>
+              <a:rPr lang="pt-BR" sz="2800" b="1" spc="110" dirty="0" smtClean="0">
+                <a:latin typeface="Book Antiqua" pitchFamily="18" charset="0"/>
+              </a:rPr>
+            </a:br>
+            <a:r>
+              <a:rPr lang="pt-BR" sz="2800" b="1" spc="110" dirty="0" smtClean="0">
+                <a:latin typeface="Book Antiqua" pitchFamily="18" charset="0"/>
+              </a:rPr>
+              <a:t/>
+            </a:r>
+            <a:br>
+              <a:rPr lang="pt-BR" sz="2800" b="1" spc="110" dirty="0" smtClean="0">
+                <a:latin typeface="Book Antiqua" pitchFamily="18" charset="0"/>
+              </a:rPr>
+            </a:br>
+            <a:r>
+              <a:rPr lang="pt-BR" sz="2800" b="1" i="1" spc="110" dirty="0" smtClean="0">
+                <a:latin typeface="Book Antiqua" pitchFamily="18" charset="0"/>
+              </a:rPr>
+              <a:t>“Duas </a:t>
+            </a:r>
+            <a:r>
+              <a:rPr lang="pt-BR" sz="2800" b="1" i="1" spc="110" dirty="0" smtClean="0">
+                <a:latin typeface="Book Antiqua" pitchFamily="18" charset="0"/>
+              </a:rPr>
+              <a:t>verdades nunca se podem contradizer</a:t>
+            </a:r>
+            <a:r>
+              <a:rPr lang="pt-BR" sz="2800" b="1" i="1" spc="110" dirty="0" smtClean="0">
+                <a:latin typeface="Book Antiqua" pitchFamily="18" charset="0"/>
+              </a:rPr>
+              <a:t>.”</a:t>
+            </a:r>
+            <a:endParaRPr lang="pt-BR" sz="2800" b="1" i="1" spc="110" dirty="0" smtClean="0">
+              <a:latin typeface="Book Antiqua" pitchFamily="18" charset="0"/>
+            </a:endParaRPr>
+          </a:p>
+          <a:p>
+            <a:endParaRPr lang="pt-BR" sz="2800" b="1" i="1" spc="110" dirty="0" smtClean="0">
+              <a:latin typeface="Book Antiqua" pitchFamily="18" charset="0"/>
+            </a:endParaRPr>
+          </a:p>
+          <a:p>
+            <a:pPr algn="r"/>
+            <a:r>
+              <a:rPr lang="pt-BR" sz="2800" b="1" spc="110" dirty="0" smtClean="0">
+                <a:latin typeface="Book Antiqua" pitchFamily="18" charset="0"/>
+              </a:rPr>
+              <a:t>(Galileu </a:t>
+            </a:r>
+            <a:r>
+              <a:rPr lang="pt-BR" sz="2800" b="1" spc="110" dirty="0" err="1" smtClean="0">
+                <a:latin typeface="Book Antiqua" pitchFamily="18" charset="0"/>
+              </a:rPr>
+              <a:t>Galilei</a:t>
+            </a:r>
+            <a:r>
+              <a:rPr lang="pt-BR" sz="2800" b="1" spc="110" dirty="0" smtClean="0">
+                <a:latin typeface="Book Antiqua" pitchFamily="18" charset="0"/>
+              </a:rPr>
+              <a:t>)</a:t>
+            </a:r>
+            <a:endParaRPr lang="pt-BR" sz="2800" b="1" spc="110" dirty="0">
+              <a:latin typeface="Book Antiqua" pitchFamily="18" charset="0"/>
+            </a:endParaRPr>
+          </a:p>
+        </p:txBody>
+      </p:sp>
+    </p:spTree>
+  </p:cSld>
+  <p:clrMapOvr>
+    <a:masterClrMapping/>
+  </p:clrMapOvr>
+</p:sld>
+</file>
+
+<file path=ppt/slides/slide6.xml><?xml version="1.0" encoding="utf-8"?>
+<p:sld xmlns:a="http://schemas.openxmlformats.org/drawingml/2006/main" xmlns:r="http://schemas.openxmlformats.org/officeDocument/2006/relationships" xmlns:p="http://schemas.openxmlformats.org/presentationml/2006/main">
+  <p:cSld>
+    <p:spTree>
+      <p:nvGrpSpPr>
+        <p:cNvPr id="1" name=""/>
+        <p:cNvGrpSpPr/>
+        <p:nvPr/>
+      </p:nvGrpSpPr>
+      <p:grpSpPr>
+        <a:xfrm>
+          <a:off x="0" y="0"/>
+          <a:ext cx="0" cy="0"/>
+          <a:chOff x="0" y="0"/>
+          <a:chExt cx="0" cy="0"/>
+        </a:xfrm>
+      </p:grpSpPr>
+      <p:sp>
+        <p:nvSpPr>
+          <p:cNvPr id="3" name="CaixaDeTexto 2"/>
+          <p:cNvSpPr txBox="1"/>
+          <p:nvPr/>
+        </p:nvSpPr>
+        <p:spPr>
+          <a:xfrm>
+            <a:off x="1357290" y="1928802"/>
+            <a:ext cx="6500858" cy="2677656"/>
+          </a:xfrm>
+          <a:prstGeom prst="rect">
+            <a:avLst/>
+          </a:prstGeom>
+          <a:noFill/>
+        </p:spPr>
+        <p:txBody>
+          <a:bodyPr wrap="square" rtlCol="0">
+            <a:spAutoFit/>
+          </a:bodyPr>
+          <a:lstStyle/>
+          <a:p>
+            <a:r>
+              <a:rPr lang="pt-BR" sz="2800" b="1" spc="110" dirty="0" smtClean="0">
+                <a:latin typeface="Book Antiqua" pitchFamily="18" charset="0"/>
+              </a:rPr>
+              <a:t/>
+            </a:r>
+            <a:br>
+              <a:rPr lang="pt-BR" sz="2800" b="1" spc="110" dirty="0" smtClean="0">
+                <a:latin typeface="Book Antiqua" pitchFamily="18" charset="0"/>
+              </a:rPr>
+            </a:br>
+            <a:r>
+              <a:rPr lang="pt-BR" sz="2800" b="1" spc="110" dirty="0" smtClean="0">
+                <a:latin typeface="Book Antiqua" pitchFamily="18" charset="0"/>
+              </a:rPr>
+              <a:t/>
+            </a:r>
+            <a:br>
+              <a:rPr lang="pt-BR" sz="2800" b="1" spc="110" dirty="0" smtClean="0">
+                <a:latin typeface="Book Antiqua" pitchFamily="18" charset="0"/>
+              </a:rPr>
+            </a:br>
+            <a:r>
+              <a:rPr lang="pt-BR" sz="2800" b="1" i="1" spc="110" dirty="0" smtClean="0">
+                <a:latin typeface="Book Antiqua" pitchFamily="18" charset="0"/>
+              </a:rPr>
+              <a:t>“</a:t>
+            </a:r>
+            <a:r>
+              <a:rPr lang="pt-BR" sz="2800" b="1" i="1" dirty="0" smtClean="0">
+                <a:latin typeface="Book Antiqua" pitchFamily="18" charset="0"/>
+              </a:rPr>
+              <a:t>Falar obscuramente qualquer um sabe; com clareza, raríssimos</a:t>
+            </a:r>
+            <a:r>
+              <a:rPr lang="pt-BR" sz="2800" b="1" i="1" spc="110" dirty="0" smtClean="0">
+                <a:latin typeface="Book Antiqua" pitchFamily="18" charset="0"/>
+              </a:rPr>
+              <a:t>.”</a:t>
+            </a:r>
+            <a:endParaRPr lang="pt-BR" sz="2800" b="1" i="1" spc="110" dirty="0" smtClean="0">
+              <a:latin typeface="Book Antiqua" pitchFamily="18" charset="0"/>
+            </a:endParaRPr>
+          </a:p>
+          <a:p>
+            <a:endParaRPr lang="pt-BR" sz="2800" b="1" i="1" spc="110" dirty="0" smtClean="0">
+              <a:latin typeface="Book Antiqua" pitchFamily="18" charset="0"/>
+            </a:endParaRPr>
+          </a:p>
+          <a:p>
+            <a:pPr algn="r"/>
+            <a:r>
+              <a:rPr lang="pt-BR" sz="2800" b="1" spc="110" dirty="0" smtClean="0">
+                <a:latin typeface="Book Antiqua" pitchFamily="18" charset="0"/>
+              </a:rPr>
+              <a:t>(Galileu </a:t>
+            </a:r>
+            <a:r>
+              <a:rPr lang="pt-BR" sz="2800" b="1" spc="110" dirty="0" err="1" smtClean="0">
+                <a:latin typeface="Book Antiqua" pitchFamily="18" charset="0"/>
+              </a:rPr>
+              <a:t>Galilei</a:t>
+            </a:r>
+            <a:r>
+              <a:rPr lang="pt-BR" sz="2800" b="1" spc="110" dirty="0" smtClean="0">
+                <a:latin typeface="Book Antiqua" pitchFamily="18" charset="0"/>
+              </a:rPr>
+              <a:t>)</a:t>
+            </a:r>
+            <a:endParaRPr lang="pt-BR" sz="2800" b="1" spc="110" dirty="0">
+              <a:latin typeface="Book Antiqua" pitchFamily="18" charset="0"/>
+            </a:endParaRPr>
+          </a:p>
+        </p:txBody>
+      </p:sp>
+    </p:spTree>
+  </p:cSld>
+  <p:clrMapOvr>
+    <a:masterClrMapping/>
+  </p:clrMapOvr>
+</p:sld>
+</file>
+
+<file path=ppt/slides/slide7.xml><?xml version="1.0" encoding="utf-8"?>
+<p:sld xmlns:a="http://schemas.openxmlformats.org/drawingml/2006/main" xmlns:r="http://schemas.openxmlformats.org/officeDocument/2006/relationships" xmlns:p="http://schemas.openxmlformats.org/presentationml/2006/main">
+  <p:cSld>
+    <p:spTree>
+      <p:nvGrpSpPr>
+        <p:cNvPr id="1" name=""/>
+        <p:cNvGrpSpPr/>
+        <p:nvPr/>
+      </p:nvGrpSpPr>
+      <p:grpSpPr>
+        <a:xfrm>
+          <a:off x="0" y="0"/>
+          <a:ext cx="0" cy="0"/>
+          <a:chOff x="0" y="0"/>
+          <a:chExt cx="0" cy="0"/>
+        </a:xfrm>
+      </p:grpSpPr>
+      <p:sp>
+        <p:nvSpPr>
+          <p:cNvPr id="3" name="CaixaDeTexto 2"/>
+          <p:cNvSpPr txBox="1"/>
+          <p:nvPr/>
+        </p:nvSpPr>
+        <p:spPr>
+          <a:xfrm>
+            <a:off x="571472" y="1928802"/>
+            <a:ext cx="7929618" cy="2677656"/>
+          </a:xfrm>
+          <a:prstGeom prst="rect">
+            <a:avLst/>
+          </a:prstGeom>
+          <a:noFill/>
+        </p:spPr>
+        <p:txBody>
+          <a:bodyPr wrap="square" rtlCol="0">
+            <a:spAutoFit/>
+          </a:bodyPr>
+          <a:lstStyle/>
+          <a:p>
+            <a:r>
+              <a:rPr lang="pt-BR" sz="2800" b="1" spc="110" dirty="0" smtClean="0">
+                <a:latin typeface="Book Antiqua" pitchFamily="18" charset="0"/>
+              </a:rPr>
+              <a:t/>
+            </a:r>
+            <a:br>
+              <a:rPr lang="pt-BR" sz="2800" b="1" spc="110" dirty="0" smtClean="0">
+                <a:latin typeface="Book Antiqua" pitchFamily="18" charset="0"/>
+              </a:rPr>
+            </a:br>
+            <a:r>
+              <a:rPr lang="pt-BR" sz="2800" b="1" spc="110" dirty="0" smtClean="0">
+                <a:latin typeface="Book Antiqua" pitchFamily="18" charset="0"/>
+              </a:rPr>
+              <a:t/>
+            </a:r>
+            <a:br>
+              <a:rPr lang="pt-BR" sz="2800" b="1" spc="110" dirty="0" smtClean="0">
+                <a:latin typeface="Book Antiqua" pitchFamily="18" charset="0"/>
+              </a:rPr>
+            </a:br>
+            <a:r>
+              <a:rPr lang="pt-BR" sz="2800" b="1" i="1" spc="110" dirty="0" smtClean="0">
+                <a:latin typeface="Book Antiqua" pitchFamily="18" charset="0"/>
+              </a:rPr>
+              <a:t>“</a:t>
+            </a:r>
+            <a:r>
+              <a:rPr lang="pt-BR" sz="2800" b="1" i="1" dirty="0" smtClean="0">
+                <a:latin typeface="Book Antiqua" pitchFamily="18" charset="0"/>
+              </a:rPr>
+              <a:t>É certamente prejudicial para as almas tornar uma </a:t>
+            </a:r>
+            <a:r>
+              <a:rPr lang="pt-BR" sz="2800" b="1" i="1" dirty="0" smtClean="0">
+                <a:latin typeface="Book Antiqua" pitchFamily="18" charset="0"/>
+              </a:rPr>
+              <a:t>heresia  o </a:t>
+            </a:r>
+            <a:r>
+              <a:rPr lang="pt-BR" sz="2800" b="1" i="1" dirty="0" smtClean="0">
+                <a:latin typeface="Book Antiqua" pitchFamily="18" charset="0"/>
+              </a:rPr>
+              <a:t>acreditar no que é provado</a:t>
+            </a:r>
+            <a:r>
+              <a:rPr lang="pt-BR" sz="2800" b="1" i="1" spc="110" dirty="0" smtClean="0">
+                <a:latin typeface="Book Antiqua" pitchFamily="18" charset="0"/>
+              </a:rPr>
+              <a:t>.”</a:t>
+            </a:r>
+            <a:endParaRPr lang="pt-BR" sz="2800" b="1" i="1" spc="110" dirty="0" smtClean="0">
+              <a:latin typeface="Book Antiqua" pitchFamily="18" charset="0"/>
+            </a:endParaRPr>
+          </a:p>
+          <a:p>
+            <a:endParaRPr lang="pt-BR" sz="2800" b="1" i="1" spc="110" dirty="0" smtClean="0">
+              <a:latin typeface="Book Antiqua" pitchFamily="18" charset="0"/>
+            </a:endParaRPr>
+          </a:p>
+          <a:p>
+            <a:pPr algn="r"/>
+            <a:r>
+              <a:rPr lang="pt-BR" sz="2800" b="1" spc="110" dirty="0" smtClean="0">
+                <a:latin typeface="Book Antiqua" pitchFamily="18" charset="0"/>
+              </a:rPr>
+              <a:t>(Galileu </a:t>
+            </a:r>
+            <a:r>
+              <a:rPr lang="pt-BR" sz="2800" b="1" spc="110" dirty="0" err="1" smtClean="0">
+                <a:latin typeface="Book Antiqua" pitchFamily="18" charset="0"/>
+              </a:rPr>
+              <a:t>Galilei</a:t>
+            </a:r>
+            <a:r>
+              <a:rPr lang="pt-BR" sz="2800" b="1" spc="110" dirty="0" smtClean="0">
+                <a:latin typeface="Book Antiqua" pitchFamily="18" charset="0"/>
+              </a:rPr>
+              <a:t>)</a:t>
+            </a:r>
+            <a:endParaRPr lang="pt-BR" sz="2800" b="1" spc="110" dirty="0">
+              <a:latin typeface="Book Antiqua" pitchFamily="18" charset="0"/>
+            </a:endParaRPr>
+          </a:p>
+        </p:txBody>
+      </p:sp>
+    </p:spTree>
+  </p:cSld>
+  <p:clrMapOvr>
+    <a:masterClrMapping/>
+  </p:clrMapOvr>
+</p:sld>
+</file>
+
+<file path=ppt/slides/slide8.xml><?xml version="1.0" encoding="utf-8"?>
+<p:sld xmlns:a="http://schemas.openxmlformats.org/drawingml/2006/main" xmlns:r="http://schemas.openxmlformats.org/officeDocument/2006/relationships" xmlns:p="http://schemas.openxmlformats.org/presentationml/2006/main">
+  <p:cSld>
+    <p:spTree>
+      <p:nvGrpSpPr>
+        <p:cNvPr id="1" name=""/>
+        <p:cNvGrpSpPr/>
+        <p:nvPr/>
+      </p:nvGrpSpPr>
+      <p:grpSpPr>
+        <a:xfrm>
+          <a:off x="0" y="0"/>
+          <a:ext cx="0" cy="0"/>
+          <a:chOff x="0" y="0"/>
+          <a:chExt cx="0" cy="0"/>
+        </a:xfrm>
+      </p:grpSpPr>
+      <p:sp>
+        <p:nvSpPr>
+          <p:cNvPr id="3" name="CaixaDeTexto 2"/>
+          <p:cNvSpPr txBox="1"/>
+          <p:nvPr/>
+        </p:nvSpPr>
+        <p:spPr>
+          <a:xfrm>
+            <a:off x="1857356" y="1928802"/>
+            <a:ext cx="5429288" cy="2677656"/>
+          </a:xfrm>
+          <a:prstGeom prst="rect">
+            <a:avLst/>
+          </a:prstGeom>
+          <a:noFill/>
+        </p:spPr>
+        <p:txBody>
+          <a:bodyPr wrap="square" rtlCol="0" anchor="ctr">
+            <a:spAutoFit/>
+          </a:bodyPr>
+          <a:lstStyle/>
+          <a:p>
+            <a:r>
+              <a:rPr lang="pt-BR" sz="2800" b="1" spc="110" dirty="0" smtClean="0">
+                <a:latin typeface="Book Antiqua" pitchFamily="18" charset="0"/>
+              </a:rPr>
+              <a:t/>
+            </a:r>
+            <a:br>
+              <a:rPr lang="pt-BR" sz="2800" b="1" spc="110" dirty="0" smtClean="0">
+                <a:latin typeface="Book Antiqua" pitchFamily="18" charset="0"/>
+              </a:rPr>
+            </a:br>
+            <a:r>
+              <a:rPr lang="pt-BR" sz="2800" b="1" spc="110" dirty="0" smtClean="0">
+                <a:latin typeface="Book Antiqua" pitchFamily="18" charset="0"/>
+              </a:rPr>
+              <a:t/>
+            </a:r>
+            <a:br>
+              <a:rPr lang="pt-BR" sz="2800" b="1" spc="110" dirty="0" smtClean="0">
+                <a:latin typeface="Book Antiqua" pitchFamily="18" charset="0"/>
+              </a:rPr>
+            </a:br>
+            <a:r>
+              <a:rPr lang="pt-BR" sz="2800" b="1" i="1" spc="110" dirty="0" smtClean="0">
+                <a:latin typeface="Book Antiqua" pitchFamily="18" charset="0"/>
+              </a:rPr>
+              <a:t>“</a:t>
+            </a:r>
+            <a:r>
+              <a:rPr lang="pt-BR" sz="2800" b="1" i="1" dirty="0" smtClean="0">
+                <a:latin typeface="Book Antiqua" pitchFamily="18" charset="0"/>
+              </a:rPr>
+              <a:t>Quanto menos alguém entende, mais quer discordar</a:t>
+            </a:r>
+            <a:r>
+              <a:rPr lang="pt-BR" sz="2800" b="1" i="1" dirty="0" smtClean="0">
+                <a:latin typeface="Book Antiqua" pitchFamily="18" charset="0"/>
+              </a:rPr>
+              <a:t>.</a:t>
+            </a:r>
+            <a:r>
+              <a:rPr lang="pt-BR" sz="2800" b="1" i="1" spc="110" dirty="0" smtClean="0">
+                <a:latin typeface="Book Antiqua" pitchFamily="18" charset="0"/>
+              </a:rPr>
+              <a:t>”</a:t>
+            </a:r>
+            <a:endParaRPr lang="pt-BR" sz="2800" b="1" i="1" spc="110" dirty="0" smtClean="0">
+              <a:latin typeface="Book Antiqua" pitchFamily="18" charset="0"/>
+            </a:endParaRPr>
+          </a:p>
+          <a:p>
+            <a:endParaRPr lang="pt-BR" sz="2800" b="1" i="1" spc="110" dirty="0" smtClean="0">
+              <a:latin typeface="Book Antiqua" pitchFamily="18" charset="0"/>
+            </a:endParaRPr>
+          </a:p>
+          <a:p>
+            <a:pPr algn="r"/>
+            <a:r>
+              <a:rPr lang="pt-BR" sz="2800" b="1" spc="110" dirty="0" smtClean="0">
+                <a:latin typeface="Book Antiqua" pitchFamily="18" charset="0"/>
+              </a:rPr>
+              <a:t>(Galileu </a:t>
+            </a:r>
+            <a:r>
+              <a:rPr lang="pt-BR" sz="2800" b="1" spc="110" dirty="0" err="1" smtClean="0">
+                <a:latin typeface="Book Antiqua" pitchFamily="18" charset="0"/>
+              </a:rPr>
+              <a:t>Galilei</a:t>
+            </a:r>
+            <a:r>
+              <a:rPr lang="pt-BR" sz="2800" b="1" spc="110" dirty="0" smtClean="0">
+                <a:latin typeface="Book Antiqua" pitchFamily="18" charset="0"/>
+              </a:rPr>
+              <a:t>)</a:t>
+            </a:r>
+            <a:endParaRPr lang="pt-BR" sz="2800" b="1" spc="110" dirty="0">
+              <a:latin typeface="Book Antiqua" pitchFamily="18" charset="0"/>
+            </a:endParaRPr>
           </a:p>
         </p:txBody>
       </p:sp>

</xml_diff>